<commit_message>
Changed agenda to point to github for the source.
</commit_message>
<xml_diff>
--- a/node/lesson-00-agenda/agenda.pptx
+++ b/node/lesson-00-agenda/agenda.pptx
@@ -18,7 +18,7 @@
   <p:sldSz cx="9144000" cy="6858000" type="screen4x3"/>
   <p:notesSz cx="6858000" cy="9144000"/>
   <p:custDataLst>
-    <p:tags r:id="rId8"/>
+    <p:tags r:id="rId7"/>
   </p:custDataLst>
   <p:defaultTextStyle>
     <a:defPPr>
@@ -1048,7 +1048,7 @@
   <p:timing>
     <p:tnLst>
       <p:par>
-        <p:cTn xmlns:p14="http://schemas.microsoft.com/office/powerpoint/2010/main" id="1" dur="indefinite" restart="never" nodeType="tmRoot"/>
+        <p:cTn id="1" dur="indefinite" restart="never" nodeType="tmRoot"/>
       </p:par>
     </p:tnLst>
   </p:timing>
@@ -1103,7 +1103,7 @@
           </a:prstGeom>
           <a:noFill/>
           <a:extLst>
-            <a:ext uri="{909E8E84-426E-40dd-AFC4-6F175D3DCCD1}">
+            <a:ext uri="{909E8E84-426E-40DD-AFC4-6F175D3DCCD1}">
               <a14:hiddenFill xmlns:a14="http://schemas.microsoft.com/office/drawing/2010/main">
                 <a:solidFill>
                   <a:srgbClr val="FFFFFF"/>
@@ -1259,7 +1259,7 @@
   <p:timing>
     <p:tnLst>
       <p:par>
-        <p:cTn xmlns:p14="http://schemas.microsoft.com/office/powerpoint/2010/main" id="1" dur="indefinite" restart="never" nodeType="tmRoot"/>
+        <p:cTn id="1" dur="indefinite" restart="never" nodeType="tmRoot"/>
       </p:par>
     </p:tnLst>
   </p:timing>
@@ -1714,7 +1714,7 @@
   <p:timing>
     <p:tnLst>
       <p:par>
-        <p:cTn xmlns:p14="http://schemas.microsoft.com/office/powerpoint/2010/main" id="1" dur="indefinite" restart="never" nodeType="tmRoot"/>
+        <p:cTn id="1" dur="indefinite" restart="never" nodeType="tmRoot"/>
       </p:par>
     </p:tnLst>
   </p:timing>
@@ -2054,7 +2054,7 @@
   <p:timing>
     <p:tnLst>
       <p:par>
-        <p:cTn xmlns:p14="http://schemas.microsoft.com/office/powerpoint/2010/main" id="1" dur="indefinite" restart="never" nodeType="tmRoot"/>
+        <p:cTn id="1" dur="indefinite" restart="never" nodeType="tmRoot"/>
       </p:par>
     </p:tnLst>
   </p:timing>
@@ -2542,7 +2542,7 @@
   <p:timing>
     <p:tnLst>
       <p:par>
-        <p:cTn xmlns:p14="http://schemas.microsoft.com/office/powerpoint/2010/main" id="1" dur="indefinite" restart="never" nodeType="tmRoot"/>
+        <p:cTn id="1" dur="indefinite" restart="never" nodeType="tmRoot"/>
       </p:par>
     </p:tnLst>
   </p:timing>
@@ -2900,7 +2900,7 @@
   <p:timing>
     <p:tnLst>
       <p:par>
-        <p:cTn xmlns:p14="http://schemas.microsoft.com/office/powerpoint/2010/main" id="1" dur="indefinite" restart="never" nodeType="tmRoot"/>
+        <p:cTn id="1" dur="indefinite" restart="never" nodeType="tmRoot"/>
       </p:par>
     </p:tnLst>
   </p:timing>
@@ -2945,21 +2945,13 @@
             </a:r>
             <a:r>
               <a:rPr lang="en-US" dirty="0" smtClean="0"/>
-              <a:t>issues</a:t>
-            </a:r>
+              <a:t>issues?</a:t>
+            </a:r>
+          </a:p>
+          <a:p>
             <a:r>
               <a:rPr lang="en-US" dirty="0" smtClean="0"/>
-              <a:t>?</a:t>
-            </a:r>
-          </a:p>
-          <a:p>
-            <a:r>
-              <a:rPr lang="en-US" dirty="0" smtClean="0"/>
-              <a:t>You must have Admin access to </a:t>
-            </a:r>
-            <a:r>
-              <a:rPr lang="en-US" smtClean="0"/>
-              <a:t>your machine</a:t>
+              <a:t>You must have Admin access to your machine</a:t>
             </a:r>
             <a:endParaRPr lang="en-US" dirty="0"/>
           </a:p>
@@ -2976,23 +2968,29 @@
             </a:r>
             <a:r>
               <a:rPr lang="en-US" dirty="0" smtClean="0"/>
-              <a:t>ourse materials</a:t>
+              <a:t>ourse </a:t>
+            </a:r>
+            <a:r>
+              <a:rPr lang="en-US" dirty="0" smtClean="0"/>
+              <a:t>materials</a:t>
             </a:r>
           </a:p>
           <a:p>
             <a:pPr lvl="1"/>
             <a:r>
-              <a:rPr lang="en-US" u="sng" dirty="0">
-                <a:hlinkClick r:id="rId3"/>
-              </a:rPr>
-              <a:t>https://www.dropbox.com/s/sbjl67wsgxwaj15/Kraken1.0-node.zip</a:t>
+              <a:rPr lang="en-US" dirty="0"/>
+              <a:t>https://github.paypal.com/GlobalTechEd/GlobalTechEd-Node.git</a:t>
             </a:r>
             <a:endParaRPr lang="en-US" dirty="0" smtClean="0"/>
           </a:p>
           <a:p>
             <a:r>
+              <a:rPr lang="en-US" smtClean="0"/>
+              <a:t>Lab </a:t>
+            </a:r>
+            <a:r>
               <a:rPr lang="en-US" dirty="0" smtClean="0"/>
-              <a:t>Lab structure</a:t>
+              <a:t>structure</a:t>
             </a:r>
           </a:p>
           <a:p>
@@ -3083,7 +3081,7 @@
   <p:timing>
     <p:tnLst>
       <p:par>
-        <p:cTn xmlns:p14="http://schemas.microsoft.com/office/powerpoint/2010/main" id="1" dur="indefinite" restart="never" nodeType="tmRoot"/>
+        <p:cTn id="1" dur="indefinite" restart="never" nodeType="tmRoot"/>
       </p:par>
     </p:tnLst>
   </p:timing>
@@ -3230,7 +3228,7 @@
   <p:timing>
     <p:tnLst>
       <p:par>
-        <p:cTn xmlns:p14="http://schemas.microsoft.com/office/powerpoint/2010/main" id="1" dur="indefinite" restart="never" nodeType="tmRoot"/>
+        <p:cTn id="1" dur="indefinite" restart="never" nodeType="tmRoot"/>
       </p:par>
     </p:tnLst>
   </p:timing>

</xml_diff>